<commit_message>
Migrate documentation section to DG
</commit_message>
<xml_diff>
--- a/docs/images/UndoAndRedo/UndoAndRedoUG.pptx
+++ b/docs/images/UndoAndRedo/UndoAndRedoUG.pptx
@@ -264,7 +264,7 @@
           <a:p>
             <a:fld id="{98F1F8E9-2157-4961-B289-4139DC3C2453}" type="datetimeFigureOut">
               <a:rPr lang="en-SG" smtClean="0"/>
-              <a:t>29/10/2019</a:t>
+              <a:t>1/11/2019</a:t>
             </a:fld>
             <a:endParaRPr lang="en-SG"/>
           </a:p>
@@ -464,7 +464,7 @@
           <a:p>
             <a:fld id="{98F1F8E9-2157-4961-B289-4139DC3C2453}" type="datetimeFigureOut">
               <a:rPr lang="en-SG" smtClean="0"/>
-              <a:t>29/10/2019</a:t>
+              <a:t>1/11/2019</a:t>
             </a:fld>
             <a:endParaRPr lang="en-SG"/>
           </a:p>
@@ -674,7 +674,7 @@
           <a:p>
             <a:fld id="{98F1F8E9-2157-4961-B289-4139DC3C2453}" type="datetimeFigureOut">
               <a:rPr lang="en-SG" smtClean="0"/>
-              <a:t>29/10/2019</a:t>
+              <a:t>1/11/2019</a:t>
             </a:fld>
             <a:endParaRPr lang="en-SG"/>
           </a:p>
@@ -874,7 +874,7 @@
           <a:p>
             <a:fld id="{98F1F8E9-2157-4961-B289-4139DC3C2453}" type="datetimeFigureOut">
               <a:rPr lang="en-SG" smtClean="0"/>
-              <a:t>29/10/2019</a:t>
+              <a:t>1/11/2019</a:t>
             </a:fld>
             <a:endParaRPr lang="en-SG"/>
           </a:p>
@@ -1150,7 +1150,7 @@
           <a:p>
             <a:fld id="{98F1F8E9-2157-4961-B289-4139DC3C2453}" type="datetimeFigureOut">
               <a:rPr lang="en-SG" smtClean="0"/>
-              <a:t>29/10/2019</a:t>
+              <a:t>1/11/2019</a:t>
             </a:fld>
             <a:endParaRPr lang="en-SG"/>
           </a:p>
@@ -1418,7 +1418,7 @@
           <a:p>
             <a:fld id="{98F1F8E9-2157-4961-B289-4139DC3C2453}" type="datetimeFigureOut">
               <a:rPr lang="en-SG" smtClean="0"/>
-              <a:t>29/10/2019</a:t>
+              <a:t>1/11/2019</a:t>
             </a:fld>
             <a:endParaRPr lang="en-SG"/>
           </a:p>
@@ -1833,7 +1833,7 @@
           <a:p>
             <a:fld id="{98F1F8E9-2157-4961-B289-4139DC3C2453}" type="datetimeFigureOut">
               <a:rPr lang="en-SG" smtClean="0"/>
-              <a:t>29/10/2019</a:t>
+              <a:t>1/11/2019</a:t>
             </a:fld>
             <a:endParaRPr lang="en-SG"/>
           </a:p>
@@ -1975,7 +1975,7 @@
           <a:p>
             <a:fld id="{98F1F8E9-2157-4961-B289-4139DC3C2453}" type="datetimeFigureOut">
               <a:rPr lang="en-SG" smtClean="0"/>
-              <a:t>29/10/2019</a:t>
+              <a:t>1/11/2019</a:t>
             </a:fld>
             <a:endParaRPr lang="en-SG"/>
           </a:p>
@@ -2088,7 +2088,7 @@
           <a:p>
             <a:fld id="{98F1F8E9-2157-4961-B289-4139DC3C2453}" type="datetimeFigureOut">
               <a:rPr lang="en-SG" smtClean="0"/>
-              <a:t>29/10/2019</a:t>
+              <a:t>1/11/2019</a:t>
             </a:fld>
             <a:endParaRPr lang="en-SG"/>
           </a:p>
@@ -2401,7 +2401,7 @@
           <a:p>
             <a:fld id="{98F1F8E9-2157-4961-B289-4139DC3C2453}" type="datetimeFigureOut">
               <a:rPr lang="en-SG" smtClean="0"/>
-              <a:t>29/10/2019</a:t>
+              <a:t>1/11/2019</a:t>
             </a:fld>
             <a:endParaRPr lang="en-SG"/>
           </a:p>
@@ -2690,7 +2690,7 @@
           <a:p>
             <a:fld id="{98F1F8E9-2157-4961-B289-4139DC3C2453}" type="datetimeFigureOut">
               <a:rPr lang="en-SG" smtClean="0"/>
-              <a:t>29/10/2019</a:t>
+              <a:t>1/11/2019</a:t>
             </a:fld>
             <a:endParaRPr lang="en-SG"/>
           </a:p>
@@ -2933,7 +2933,7 @@
           <a:p>
             <a:fld id="{98F1F8E9-2157-4961-B289-4139DC3C2453}" type="datetimeFigureOut">
               <a:rPr lang="en-SG" smtClean="0"/>
-              <a:t>29/10/2019</a:t>
+              <a:t>1/11/2019</a:t>
             </a:fld>
             <a:endParaRPr lang="en-SG"/>
           </a:p>
@@ -3352,10 +3352,10 @@
       </p:grpSpPr>
       <p:grpSp>
         <p:nvGrpSpPr>
-          <p:cNvPr id="26" name="Group 25">
-            <a:extLst>
-              <a:ext uri="{FF2B5EF4-FFF2-40B4-BE49-F238E27FC236}">
-                <a16:creationId xmlns:a16="http://schemas.microsoft.com/office/drawing/2014/main" id="{DC5E3A23-F059-418D-8B2C-36667EF453CD}"/>
+          <p:cNvPr id="2" name="Group 1">
+            <a:extLst>
+              <a:ext uri="{FF2B5EF4-FFF2-40B4-BE49-F238E27FC236}">
+                <a16:creationId xmlns:a16="http://schemas.microsoft.com/office/drawing/2014/main" id="{419B3B6F-3161-44E6-A0F0-2DD6D445C4EB}"/>
               </a:ext>
             </a:extLst>
           </p:cNvPr>
@@ -3364,18 +3364,48 @@
         </p:nvGrpSpPr>
         <p:grpSpPr>
           <a:xfrm>
-            <a:off x="1831332" y="0"/>
-            <a:ext cx="8529335" cy="6858000"/>
-            <a:chOff x="1831332" y="0"/>
-            <a:chExt cx="8529335" cy="6858000"/>
+            <a:off x="1827033" y="0"/>
+            <a:ext cx="8537933" cy="6858000"/>
+            <a:chOff x="1827033" y="0"/>
+            <a:chExt cx="8537933" cy="6858000"/>
           </a:xfrm>
         </p:grpSpPr>
+        <p:pic>
+          <p:nvPicPr>
+            <p:cNvPr id="4" name="Picture 3">
+              <a:extLst>
+                <a:ext uri="{FF2B5EF4-FFF2-40B4-BE49-F238E27FC236}">
+                  <a16:creationId xmlns:a16="http://schemas.microsoft.com/office/drawing/2014/main" id="{DCCCA0F4-18E1-4C80-A0A8-953516FCA0E3}"/>
+                </a:ext>
+              </a:extLst>
+            </p:cNvPr>
+            <p:cNvPicPr>
+              <a:picLocks noChangeAspect="1"/>
+            </p:cNvPicPr>
+            <p:nvPr/>
+          </p:nvPicPr>
+          <p:blipFill>
+            <a:blip r:embed="rId2"/>
+            <a:stretch>
+              <a:fillRect/>
+            </a:stretch>
+          </p:blipFill>
+          <p:spPr>
+            <a:xfrm>
+              <a:off x="1827033" y="0"/>
+              <a:ext cx="8537933" cy="6858000"/>
+            </a:xfrm>
+            <a:prstGeom prst="rect">
+              <a:avLst/>
+            </a:prstGeom>
+          </p:spPr>
+        </p:pic>
         <p:grpSp>
           <p:nvGrpSpPr>
-            <p:cNvPr id="15" name="Group 14">
+            <p:cNvPr id="26" name="Group 25">
               <a:extLst>
                 <a:ext uri="{FF2B5EF4-FFF2-40B4-BE49-F238E27FC236}">
-                  <a16:creationId xmlns:a16="http://schemas.microsoft.com/office/drawing/2014/main" id="{44C7387E-360E-4E5C-B5B8-4D256EAC072F}"/>
+                  <a16:creationId xmlns:a16="http://schemas.microsoft.com/office/drawing/2014/main" id="{DC5E3A23-F059-418D-8B2C-36667EF453CD}"/>
                 </a:ext>
               </a:extLst>
             </p:cNvPr>
@@ -3384,42 +3414,12 @@
           </p:nvGrpSpPr>
           <p:grpSpPr>
             <a:xfrm>
-              <a:off x="1831332" y="0"/>
-              <a:ext cx="8529335" cy="6858000"/>
-              <a:chOff x="1831332" y="0"/>
-              <a:chExt cx="8529335" cy="6858000"/>
+              <a:off x="1927935" y="594352"/>
+              <a:ext cx="2412571" cy="342900"/>
+              <a:chOff x="1927935" y="594352"/>
+              <a:chExt cx="2412571" cy="342900"/>
             </a:xfrm>
           </p:grpSpPr>
-          <p:pic>
-            <p:nvPicPr>
-              <p:cNvPr id="14" name="Picture 13">
-                <a:extLst>
-                  <a:ext uri="{FF2B5EF4-FFF2-40B4-BE49-F238E27FC236}">
-                    <a16:creationId xmlns:a16="http://schemas.microsoft.com/office/drawing/2014/main" id="{AD6F771C-7CF9-414A-83BF-F50575ED1A41}"/>
-                  </a:ext>
-                </a:extLst>
-              </p:cNvPr>
-              <p:cNvPicPr>
-                <a:picLocks noChangeAspect="1"/>
-              </p:cNvPicPr>
-              <p:nvPr/>
-            </p:nvPicPr>
-            <p:blipFill>
-              <a:blip r:embed="rId2"/>
-              <a:stretch>
-                <a:fillRect/>
-              </a:stretch>
-            </p:blipFill>
-            <p:spPr>
-              <a:xfrm>
-                <a:off x="1831332" y="0"/>
-                <a:ext cx="8529335" cy="6858000"/>
-              </a:xfrm>
-              <a:prstGeom prst="rect">
-                <a:avLst/>
-              </a:prstGeom>
-            </p:spPr>
-          </p:pic>
           <p:sp>
             <p:nvSpPr>
               <p:cNvPr id="13" name="Frame 12">
@@ -3478,107 +3478,107 @@
               </a:p>
             </p:txBody>
           </p:sp>
-        </p:grpSp>
-        <p:cxnSp>
-          <p:nvCxnSpPr>
-            <p:cNvPr id="16" name="Straight Arrow Connector 15">
-              <a:extLst>
-                <a:ext uri="{FF2B5EF4-FFF2-40B4-BE49-F238E27FC236}">
-                  <a16:creationId xmlns:a16="http://schemas.microsoft.com/office/drawing/2014/main" id="{96BB0FE5-D464-4D9A-B283-DC970FACEB00}"/>
-                </a:ext>
-              </a:extLst>
-            </p:cNvPr>
-            <p:cNvCxnSpPr>
-              <a:cxnSpLocks/>
-            </p:cNvCxnSpPr>
-            <p:nvPr/>
-          </p:nvCxnSpPr>
-          <p:spPr>
-            <a:xfrm flipH="1">
-              <a:off x="2500133" y="804239"/>
-              <a:ext cx="435326" cy="0"/>
-            </a:xfrm>
-            <a:prstGeom prst="straightConnector1">
-              <a:avLst/>
-            </a:prstGeom>
-            <a:ln>
+          <p:cxnSp>
+            <p:nvCxnSpPr>
+              <p:cNvPr id="16" name="Straight Arrow Connector 15">
+                <a:extLst>
+                  <a:ext uri="{FF2B5EF4-FFF2-40B4-BE49-F238E27FC236}">
+                    <a16:creationId xmlns:a16="http://schemas.microsoft.com/office/drawing/2014/main" id="{96BB0FE5-D464-4D9A-B283-DC970FACEB00}"/>
+                  </a:ext>
+                </a:extLst>
+              </p:cNvPr>
+              <p:cNvCxnSpPr>
+                <a:cxnSpLocks/>
+              </p:cNvCxnSpPr>
+              <p:nvPr/>
+            </p:nvCxnSpPr>
+            <p:spPr>
+              <a:xfrm flipH="1">
+                <a:off x="2500133" y="804239"/>
+                <a:ext cx="435326" cy="0"/>
+              </a:xfrm>
+              <a:prstGeom prst="straightConnector1">
+                <a:avLst/>
+              </a:prstGeom>
+              <a:ln>
+                <a:solidFill>
+                  <a:schemeClr val="tx2"/>
+                </a:solidFill>
+                <a:tailEnd type="triangle"/>
+              </a:ln>
+            </p:spPr>
+            <p:style>
+              <a:lnRef idx="3">
+                <a:schemeClr val="dk1"/>
+              </a:lnRef>
+              <a:fillRef idx="0">
+                <a:schemeClr val="dk1"/>
+              </a:fillRef>
+              <a:effectRef idx="2">
+                <a:schemeClr val="dk1"/>
+              </a:effectRef>
+              <a:fontRef idx="minor">
+                <a:schemeClr val="tx1"/>
+              </a:fontRef>
+            </p:style>
+          </p:cxnSp>
+          <p:sp>
+            <p:nvSpPr>
+              <p:cNvPr id="17" name="Rectangle 16">
+                <a:extLst>
+                  <a:ext uri="{FF2B5EF4-FFF2-40B4-BE49-F238E27FC236}">
+                    <a16:creationId xmlns:a16="http://schemas.microsoft.com/office/drawing/2014/main" id="{5839EEDF-C49C-4B20-AB32-992E9F2F49F5}"/>
+                  </a:ext>
+                </a:extLst>
+              </p:cNvPr>
+              <p:cNvSpPr/>
+              <p:nvPr/>
+            </p:nvSpPr>
+            <p:spPr>
+              <a:xfrm>
+                <a:off x="2936411" y="594352"/>
+                <a:ext cx="1404095" cy="342897"/>
+              </a:xfrm>
+              <a:prstGeom prst="rect">
+                <a:avLst/>
+              </a:prstGeom>
               <a:solidFill>
                 <a:schemeClr val="tx2"/>
               </a:solidFill>
-              <a:tailEnd type="triangle"/>
-            </a:ln>
-          </p:spPr>
-          <p:style>
-            <a:lnRef idx="3">
-              <a:schemeClr val="dk1"/>
-            </a:lnRef>
-            <a:fillRef idx="0">
-              <a:schemeClr val="dk1"/>
-            </a:fillRef>
-            <a:effectRef idx="2">
-              <a:schemeClr val="dk1"/>
-            </a:effectRef>
-            <a:fontRef idx="minor">
-              <a:schemeClr val="tx1"/>
-            </a:fontRef>
-          </p:style>
-        </p:cxnSp>
-        <p:sp>
-          <p:nvSpPr>
-            <p:cNvPr id="17" name="Rectangle 16">
-              <a:extLst>
-                <a:ext uri="{FF2B5EF4-FFF2-40B4-BE49-F238E27FC236}">
-                  <a16:creationId xmlns:a16="http://schemas.microsoft.com/office/drawing/2014/main" id="{5839EEDF-C49C-4B20-AB32-992E9F2F49F5}"/>
-                </a:ext>
-              </a:extLst>
-            </p:cNvPr>
-            <p:cNvSpPr/>
-            <p:nvPr/>
-          </p:nvSpPr>
-          <p:spPr>
-            <a:xfrm>
-              <a:off x="2936411" y="594352"/>
-              <a:ext cx="1404095" cy="342897"/>
-            </a:xfrm>
-            <a:prstGeom prst="rect">
-              <a:avLst/>
-            </a:prstGeom>
-            <a:solidFill>
-              <a:schemeClr val="tx2"/>
-            </a:solidFill>
-            <a:ln>
-              <a:noFill/>
-            </a:ln>
-          </p:spPr>
-          <p:style>
-            <a:lnRef idx="2">
-              <a:schemeClr val="accent1">
-                <a:shade val="50000"/>
-              </a:schemeClr>
-            </a:lnRef>
-            <a:fillRef idx="1">
-              <a:schemeClr val="accent1"/>
-            </a:fillRef>
-            <a:effectRef idx="0">
-              <a:schemeClr val="accent1"/>
-            </a:effectRef>
-            <a:fontRef idx="minor">
-              <a:schemeClr val="lt1"/>
-            </a:fontRef>
-          </p:style>
-          <p:txBody>
-            <a:bodyPr rtlCol="0" anchor="ctr"/>
-            <a:lstStyle/>
-            <a:p>
-              <a:pPr algn="ctr"/>
-              <a:r>
-                <a:rPr lang="en-US" sz="1200" dirty="0"/>
-                <a:t>Your input</a:t>
-              </a:r>
-              <a:endParaRPr lang="en-SG" sz="1200" dirty="0"/>
-            </a:p>
-          </p:txBody>
-        </p:sp>
+              <a:ln>
+                <a:noFill/>
+              </a:ln>
+            </p:spPr>
+            <p:style>
+              <a:lnRef idx="2">
+                <a:schemeClr val="accent1">
+                  <a:shade val="50000"/>
+                </a:schemeClr>
+              </a:lnRef>
+              <a:fillRef idx="1">
+                <a:schemeClr val="accent1"/>
+              </a:fillRef>
+              <a:effectRef idx="0">
+                <a:schemeClr val="accent1"/>
+              </a:effectRef>
+              <a:fontRef idx="minor">
+                <a:schemeClr val="lt1"/>
+              </a:fontRef>
+            </p:style>
+            <p:txBody>
+              <a:bodyPr rtlCol="0" anchor="ctr"/>
+              <a:lstStyle/>
+              <a:p>
+                <a:pPr algn="ctr"/>
+                <a:r>
+                  <a:rPr lang="en-US" sz="1200" dirty="0"/>
+                  <a:t>Your input</a:t>
+                </a:r>
+                <a:endParaRPr lang="en-SG" sz="1200" dirty="0"/>
+              </a:p>
+            </p:txBody>
+          </p:sp>
+        </p:grpSp>
       </p:grpSp>
     </p:spTree>
     <p:extLst>
@@ -3612,10 +3612,10 @@
       </p:grpSpPr>
       <p:grpSp>
         <p:nvGrpSpPr>
-          <p:cNvPr id="32" name="Group 31">
-            <a:extLst>
-              <a:ext uri="{FF2B5EF4-FFF2-40B4-BE49-F238E27FC236}">
-                <a16:creationId xmlns:a16="http://schemas.microsoft.com/office/drawing/2014/main" id="{EA5CEEEF-6594-4F85-BF01-77CDF119369E}"/>
+          <p:cNvPr id="3" name="Group 2">
+            <a:extLst>
+              <a:ext uri="{FF2B5EF4-FFF2-40B4-BE49-F238E27FC236}">
+                <a16:creationId xmlns:a16="http://schemas.microsoft.com/office/drawing/2014/main" id="{9FBC2FF3-B2A0-495F-AC8A-F5A1D77E7460}"/>
               </a:ext>
             </a:extLst>
           </p:cNvPr>
@@ -3624,18 +3624,48 @@
         </p:nvGrpSpPr>
         <p:grpSpPr>
           <a:xfrm>
-            <a:off x="1830490" y="0"/>
-            <a:ext cx="8531020" cy="6858000"/>
-            <a:chOff x="1830490" y="0"/>
-            <a:chExt cx="8531020" cy="6858000"/>
+            <a:off x="1835622" y="0"/>
+            <a:ext cx="8520755" cy="6858000"/>
+            <a:chOff x="1835622" y="0"/>
+            <a:chExt cx="8520755" cy="6858000"/>
           </a:xfrm>
         </p:grpSpPr>
+        <p:pic>
+          <p:nvPicPr>
+            <p:cNvPr id="2" name="Picture 1">
+              <a:extLst>
+                <a:ext uri="{FF2B5EF4-FFF2-40B4-BE49-F238E27FC236}">
+                  <a16:creationId xmlns:a16="http://schemas.microsoft.com/office/drawing/2014/main" id="{BD697C44-79B6-4134-96BA-ACF10CF28AA5}"/>
+                </a:ext>
+              </a:extLst>
+            </p:cNvPr>
+            <p:cNvPicPr>
+              <a:picLocks noChangeAspect="1"/>
+            </p:cNvPicPr>
+            <p:nvPr/>
+          </p:nvPicPr>
+          <p:blipFill>
+            <a:blip r:embed="rId2"/>
+            <a:stretch>
+              <a:fillRect/>
+            </a:stretch>
+          </p:blipFill>
+          <p:spPr>
+            <a:xfrm>
+              <a:off x="1835622" y="0"/>
+              <a:ext cx="8520755" cy="6858000"/>
+            </a:xfrm>
+            <a:prstGeom prst="rect">
+              <a:avLst/>
+            </a:prstGeom>
+          </p:spPr>
+        </p:pic>
         <p:grpSp>
           <p:nvGrpSpPr>
-            <p:cNvPr id="14" name="Group 13">
+            <p:cNvPr id="32" name="Group 31">
               <a:extLst>
                 <a:ext uri="{FF2B5EF4-FFF2-40B4-BE49-F238E27FC236}">
-                  <a16:creationId xmlns:a16="http://schemas.microsoft.com/office/drawing/2014/main" id="{65EC1F0F-95CF-48AF-BF1B-2920B1F0E6F5}"/>
+                  <a16:creationId xmlns:a16="http://schemas.microsoft.com/office/drawing/2014/main" id="{EA5CEEEF-6594-4F85-BF01-77CDF119369E}"/>
                 </a:ext>
               </a:extLst>
             </p:cNvPr>
@@ -3644,48 +3674,718 @@
           </p:nvGrpSpPr>
           <p:grpSpPr>
             <a:xfrm>
-              <a:off x="1830490" y="0"/>
-              <a:ext cx="8531020" cy="6858000"/>
-              <a:chOff x="1830490" y="0"/>
-              <a:chExt cx="8531020" cy="6858000"/>
+              <a:off x="1927934" y="407670"/>
+              <a:ext cx="8191426" cy="5924550"/>
+              <a:chOff x="1927934" y="407670"/>
+              <a:chExt cx="8191426" cy="5924550"/>
             </a:xfrm>
           </p:grpSpPr>
-          <p:pic>
-            <p:nvPicPr>
-              <p:cNvPr id="4" name="Picture 3">
+          <p:grpSp>
+            <p:nvGrpSpPr>
+              <p:cNvPr id="14" name="Group 13">
                 <a:extLst>
                   <a:ext uri="{FF2B5EF4-FFF2-40B4-BE49-F238E27FC236}">
-                    <a16:creationId xmlns:a16="http://schemas.microsoft.com/office/drawing/2014/main" id="{67CFDC32-81B9-4B3F-8112-A9F8E31084E6}"/>
+                    <a16:creationId xmlns:a16="http://schemas.microsoft.com/office/drawing/2014/main" id="{65EC1F0F-95CF-48AF-BF1B-2920B1F0E6F5}"/>
                   </a:ext>
                 </a:extLst>
               </p:cNvPr>
-              <p:cNvPicPr>
-                <a:picLocks noChangeAspect="1"/>
-              </p:cNvPicPr>
+              <p:cNvGrpSpPr/>
               <p:nvPr/>
-            </p:nvPicPr>
-            <p:blipFill>
-              <a:blip r:embed="rId2"/>
-              <a:stretch>
-                <a:fillRect/>
-              </a:stretch>
-            </p:blipFill>
+            </p:nvGrpSpPr>
+            <p:grpSpPr>
+              <a:xfrm>
+                <a:off x="1927934" y="1059180"/>
+                <a:ext cx="8191426" cy="5273040"/>
+                <a:chOff x="1927934" y="1059180"/>
+                <a:chExt cx="8191426" cy="5273040"/>
+              </a:xfrm>
+            </p:grpSpPr>
+            <p:sp>
+              <p:nvSpPr>
+                <p:cNvPr id="11" name="Frame 10">
+                  <a:extLst>
+                    <a:ext uri="{FF2B5EF4-FFF2-40B4-BE49-F238E27FC236}">
+                      <a16:creationId xmlns:a16="http://schemas.microsoft.com/office/drawing/2014/main" id="{DD83794B-04D8-4349-9DE2-B86EEC7EF66B}"/>
+                    </a:ext>
+                  </a:extLst>
+                </p:cNvPr>
+                <p:cNvSpPr/>
+                <p:nvPr/>
+              </p:nvSpPr>
+              <p:spPr>
+                <a:xfrm>
+                  <a:off x="1927934" y="1059180"/>
+                  <a:ext cx="5757656" cy="630724"/>
+                </a:xfrm>
+                <a:prstGeom prst="frame">
+                  <a:avLst>
+                    <a:gd name="adj1" fmla="val 3930"/>
+                  </a:avLst>
+                </a:prstGeom>
+                <a:solidFill>
+                  <a:srgbClr val="FC3737"/>
+                </a:solidFill>
+                <a:ln>
+                  <a:noFill/>
+                </a:ln>
+              </p:spPr>
+              <p:style>
+                <a:lnRef idx="2">
+                  <a:schemeClr val="accent1">
+                    <a:shade val="50000"/>
+                  </a:schemeClr>
+                </a:lnRef>
+                <a:fillRef idx="1">
+                  <a:schemeClr val="accent1"/>
+                </a:fillRef>
+                <a:effectRef idx="0">
+                  <a:schemeClr val="accent1"/>
+                </a:effectRef>
+                <a:fontRef idx="minor">
+                  <a:schemeClr val="lt1"/>
+                </a:fontRef>
+              </p:style>
+              <p:txBody>
+                <a:bodyPr rtlCol="0" anchor="ctr"/>
+                <a:lstStyle/>
+                <a:p>
+                  <a:pPr algn="ctr"/>
+                  <a:endParaRPr lang="en-SG">
+                    <a:solidFill>
+                      <a:schemeClr val="tx1"/>
+                    </a:solidFill>
+                  </a:endParaRPr>
+                </a:p>
+              </p:txBody>
+            </p:sp>
+            <p:sp>
+              <p:nvSpPr>
+                <p:cNvPr id="13" name="Frame 12">
+                  <a:extLst>
+                    <a:ext uri="{FF2B5EF4-FFF2-40B4-BE49-F238E27FC236}">
+                      <a16:creationId xmlns:a16="http://schemas.microsoft.com/office/drawing/2014/main" id="{69339133-591A-4ACB-A20F-47351E688EDF}"/>
+                    </a:ext>
+                  </a:extLst>
+                </p:cNvPr>
+                <p:cNvSpPr/>
+                <p:nvPr/>
+              </p:nvSpPr>
+              <p:spPr>
+                <a:xfrm>
+                  <a:off x="1927934" y="5379720"/>
+                  <a:ext cx="8191426" cy="952500"/>
+                </a:xfrm>
+                <a:prstGeom prst="frame">
+                  <a:avLst>
+                    <a:gd name="adj1" fmla="val 3090"/>
+                  </a:avLst>
+                </a:prstGeom>
+                <a:solidFill>
+                  <a:srgbClr val="FC3737"/>
+                </a:solidFill>
+                <a:ln>
+                  <a:noFill/>
+                </a:ln>
+              </p:spPr>
+              <p:style>
+                <a:lnRef idx="2">
+                  <a:schemeClr val="accent1">
+                    <a:shade val="50000"/>
+                  </a:schemeClr>
+                </a:lnRef>
+                <a:fillRef idx="1">
+                  <a:schemeClr val="accent1"/>
+                </a:fillRef>
+                <a:effectRef idx="0">
+                  <a:schemeClr val="accent1"/>
+                </a:effectRef>
+                <a:fontRef idx="minor">
+                  <a:schemeClr val="lt1"/>
+                </a:fontRef>
+              </p:style>
+              <p:txBody>
+                <a:bodyPr rtlCol="0" anchor="ctr"/>
+                <a:lstStyle/>
+                <a:p>
+                  <a:pPr algn="ctr"/>
+                  <a:endParaRPr lang="en-SG">
+                    <a:solidFill>
+                      <a:schemeClr val="tx1"/>
+                    </a:solidFill>
+                  </a:endParaRPr>
+                </a:p>
+              </p:txBody>
+            </p:sp>
+          </p:grpSp>
+          <p:cxnSp>
+            <p:nvCxnSpPr>
+              <p:cNvPr id="17" name="Straight Arrow Connector 16">
+                <a:extLst>
+                  <a:ext uri="{FF2B5EF4-FFF2-40B4-BE49-F238E27FC236}">
+                    <a16:creationId xmlns:a16="http://schemas.microsoft.com/office/drawing/2014/main" id="{08F32483-5C66-4573-A74B-C9B2EFE28688}"/>
+                  </a:ext>
+                </a:extLst>
+              </p:cNvPr>
+              <p:cNvCxnSpPr>
+                <a:cxnSpLocks/>
+              </p:cNvCxnSpPr>
+              <p:nvPr/>
+            </p:nvCxnSpPr>
             <p:spPr>
               <a:xfrm>
-                <a:off x="1830490" y="0"/>
-                <a:ext cx="8531020" cy="6858000"/>
+                <a:off x="5128742" y="720090"/>
+                <a:ext cx="0" cy="342900"/>
+              </a:xfrm>
+              <a:prstGeom prst="straightConnector1">
+                <a:avLst/>
+              </a:prstGeom>
+              <a:ln>
+                <a:solidFill>
+                  <a:schemeClr val="tx2"/>
+                </a:solidFill>
+                <a:tailEnd type="triangle"/>
+              </a:ln>
+            </p:spPr>
+            <p:style>
+              <a:lnRef idx="3">
+                <a:schemeClr val="dk1"/>
+              </a:lnRef>
+              <a:fillRef idx="0">
+                <a:schemeClr val="dk1"/>
+              </a:fillRef>
+              <a:effectRef idx="2">
+                <a:schemeClr val="dk1"/>
+              </a:effectRef>
+              <a:fontRef idx="minor">
+                <a:schemeClr val="tx1"/>
+              </a:fontRef>
+            </p:style>
+          </p:cxnSp>
+          <p:sp>
+            <p:nvSpPr>
+              <p:cNvPr id="15" name="Rectangle 14">
+                <a:extLst>
+                  <a:ext uri="{FF2B5EF4-FFF2-40B4-BE49-F238E27FC236}">
+                    <a16:creationId xmlns:a16="http://schemas.microsoft.com/office/drawing/2014/main" id="{68646DD1-E1A2-4914-B6B8-C1B477191D1A}"/>
+                  </a:ext>
+                </a:extLst>
+              </p:cNvPr>
+              <p:cNvSpPr/>
+              <p:nvPr/>
+            </p:nvSpPr>
+            <p:spPr>
+              <a:xfrm>
+                <a:off x="4054322" y="407670"/>
+                <a:ext cx="2148840" cy="342900"/>
               </a:xfrm>
               <a:prstGeom prst="rect">
                 <a:avLst/>
               </a:prstGeom>
+              <a:solidFill>
+                <a:schemeClr val="tx2"/>
+              </a:solidFill>
+              <a:ln>
+                <a:noFill/>
+              </a:ln>
             </p:spPr>
-          </p:pic>
+            <p:style>
+              <a:lnRef idx="2">
+                <a:schemeClr val="accent1">
+                  <a:shade val="50000"/>
+                </a:schemeClr>
+              </a:lnRef>
+              <a:fillRef idx="1">
+                <a:schemeClr val="accent1"/>
+              </a:fillRef>
+              <a:effectRef idx="0">
+                <a:schemeClr val="accent1"/>
+              </a:effectRef>
+              <a:fontRef idx="minor">
+                <a:schemeClr val="lt1"/>
+              </a:fontRef>
+            </p:style>
+            <p:txBody>
+              <a:bodyPr rtlCol="0" anchor="ctr"/>
+              <a:lstStyle/>
+              <a:p>
+                <a:pPr algn="ctr"/>
+                <a:r>
+                  <a:rPr lang="en-US" sz="1200" dirty="0"/>
+                  <a:t>A success message is displayed</a:t>
+                </a:r>
+                <a:endParaRPr lang="en-SG" sz="1200" dirty="0"/>
+              </a:p>
+            </p:txBody>
+          </p:sp>
+          <p:cxnSp>
+            <p:nvCxnSpPr>
+              <p:cNvPr id="22" name="Straight Arrow Connector 21">
+                <a:extLst>
+                  <a:ext uri="{FF2B5EF4-FFF2-40B4-BE49-F238E27FC236}">
+                    <a16:creationId xmlns:a16="http://schemas.microsoft.com/office/drawing/2014/main" id="{77A9152A-57A1-4FA2-B75A-74AEB74DE939}"/>
+                  </a:ext>
+                </a:extLst>
+              </p:cNvPr>
+              <p:cNvCxnSpPr>
+                <a:cxnSpLocks/>
+                <a:stCxn id="21" idx="2"/>
+              </p:cNvCxnSpPr>
+              <p:nvPr/>
+            </p:nvCxnSpPr>
+            <p:spPr>
+              <a:xfrm>
+                <a:off x="7026325" y="5105400"/>
+                <a:ext cx="0" cy="274320"/>
+              </a:xfrm>
+              <a:prstGeom prst="straightConnector1">
+                <a:avLst/>
+              </a:prstGeom>
+              <a:ln>
+                <a:solidFill>
+                  <a:schemeClr val="tx2"/>
+                </a:solidFill>
+                <a:tailEnd type="triangle"/>
+              </a:ln>
+            </p:spPr>
+            <p:style>
+              <a:lnRef idx="3">
+                <a:schemeClr val="dk1"/>
+              </a:lnRef>
+              <a:fillRef idx="0">
+                <a:schemeClr val="dk1"/>
+              </a:fillRef>
+              <a:effectRef idx="2">
+                <a:schemeClr val="dk1"/>
+              </a:effectRef>
+              <a:fontRef idx="minor">
+                <a:schemeClr val="tx1"/>
+              </a:fontRef>
+            </p:style>
+          </p:cxnSp>
           <p:sp>
             <p:nvSpPr>
-              <p:cNvPr id="11" name="Frame 10">
+              <p:cNvPr id="21" name="Rectangle 20">
                 <a:extLst>
                   <a:ext uri="{FF2B5EF4-FFF2-40B4-BE49-F238E27FC236}">
-                    <a16:creationId xmlns:a16="http://schemas.microsoft.com/office/drawing/2014/main" id="{DD83794B-04D8-4349-9DE2-B86EEC7EF66B}"/>
+                    <a16:creationId xmlns:a16="http://schemas.microsoft.com/office/drawing/2014/main" id="{E02C06DD-34FD-4E05-BD92-44282B030013}"/>
+                  </a:ext>
+                </a:extLst>
+              </p:cNvPr>
+              <p:cNvSpPr/>
+              <p:nvPr/>
+            </p:nvSpPr>
+            <p:spPr>
+              <a:xfrm>
+                <a:off x="5973969" y="4643021"/>
+                <a:ext cx="2104711" cy="462379"/>
+              </a:xfrm>
+              <a:prstGeom prst="rect">
+                <a:avLst/>
+              </a:prstGeom>
+              <a:solidFill>
+                <a:schemeClr val="tx2"/>
+              </a:solidFill>
+              <a:ln>
+                <a:noFill/>
+              </a:ln>
+            </p:spPr>
+            <p:style>
+              <a:lnRef idx="2">
+                <a:schemeClr val="accent1">
+                  <a:shade val="50000"/>
+                </a:schemeClr>
+              </a:lnRef>
+              <a:fillRef idx="1">
+                <a:schemeClr val="accent1"/>
+              </a:fillRef>
+              <a:effectRef idx="0">
+                <a:schemeClr val="accent1"/>
+              </a:effectRef>
+              <a:fontRef idx="minor">
+                <a:schemeClr val="lt1"/>
+              </a:fontRef>
+            </p:style>
+            <p:txBody>
+              <a:bodyPr rtlCol="0" anchor="ctr"/>
+              <a:lstStyle/>
+              <a:p>
+                <a:pPr algn="ctr"/>
+                <a:r>
+                  <a:rPr lang="en-US" sz="1200" dirty="0"/>
+                  <a:t>The deleted transaction adds back to the list</a:t>
+                </a:r>
+                <a:endParaRPr lang="en-SG" sz="1200" dirty="0"/>
+              </a:p>
+            </p:txBody>
+          </p:sp>
+        </p:grpSp>
+      </p:grpSp>
+    </p:spTree>
+    <p:extLst>
+      <p:ext uri="{BB962C8B-B14F-4D97-AF65-F5344CB8AC3E}">
+        <p14:creationId xmlns:p14="http://schemas.microsoft.com/office/powerpoint/2010/main" val="3237955224"/>
+      </p:ext>
+    </p:extLst>
+  </p:cSld>
+  <p:clrMapOvr>
+    <a:masterClrMapping/>
+  </p:clrMapOvr>
+</p:sld>
+</file>
+
+<file path=ppt/slides/slide3.xml><?xml version="1.0" encoding="utf-8"?>
+<p:sld xmlns:a="http://schemas.openxmlformats.org/drawingml/2006/main" xmlns:r="http://schemas.openxmlformats.org/officeDocument/2006/relationships" xmlns:p="http://schemas.openxmlformats.org/presentationml/2006/main">
+  <p:cSld>
+    <p:spTree>
+      <p:nvGrpSpPr>
+        <p:cNvPr id="1" name=""/>
+        <p:cNvGrpSpPr/>
+        <p:nvPr/>
+      </p:nvGrpSpPr>
+      <p:grpSpPr>
+        <a:xfrm>
+          <a:off x="0" y="0"/>
+          <a:ext cx="0" cy="0"/>
+          <a:chOff x="0" y="0"/>
+          <a:chExt cx="0" cy="0"/>
+        </a:xfrm>
+      </p:grpSpPr>
+      <p:grpSp>
+        <p:nvGrpSpPr>
+          <p:cNvPr id="4" name="Group 3">
+            <a:extLst>
+              <a:ext uri="{FF2B5EF4-FFF2-40B4-BE49-F238E27FC236}">
+                <a16:creationId xmlns:a16="http://schemas.microsoft.com/office/drawing/2014/main" id="{62F41AA9-94A7-4B85-B6A1-8B0DA4233983}"/>
+              </a:ext>
+            </a:extLst>
+          </p:cNvPr>
+          <p:cNvGrpSpPr/>
+          <p:nvPr/>
+        </p:nvGrpSpPr>
+        <p:grpSpPr>
+          <a:xfrm>
+            <a:off x="1833946" y="0"/>
+            <a:ext cx="8524107" cy="6858000"/>
+            <a:chOff x="1833946" y="0"/>
+            <a:chExt cx="8524107" cy="6858000"/>
+          </a:xfrm>
+        </p:grpSpPr>
+        <p:pic>
+          <p:nvPicPr>
+            <p:cNvPr id="3" name="Picture 2">
+              <a:extLst>
+                <a:ext uri="{FF2B5EF4-FFF2-40B4-BE49-F238E27FC236}">
+                  <a16:creationId xmlns:a16="http://schemas.microsoft.com/office/drawing/2014/main" id="{FDDEFB9D-9E6B-4813-A8E4-328F7C43ECD6}"/>
+                </a:ext>
+              </a:extLst>
+            </p:cNvPr>
+            <p:cNvPicPr>
+              <a:picLocks noChangeAspect="1"/>
+            </p:cNvPicPr>
+            <p:nvPr/>
+          </p:nvPicPr>
+          <p:blipFill>
+            <a:blip r:embed="rId2"/>
+            <a:stretch>
+              <a:fillRect/>
+            </a:stretch>
+          </p:blipFill>
+          <p:spPr>
+            <a:xfrm>
+              <a:off x="1833946" y="0"/>
+              <a:ext cx="8524107" cy="6858000"/>
+            </a:xfrm>
+            <a:prstGeom prst="rect">
+              <a:avLst/>
+            </a:prstGeom>
+          </p:spPr>
+        </p:pic>
+        <p:grpSp>
+          <p:nvGrpSpPr>
+            <p:cNvPr id="9" name="Group 8">
+              <a:extLst>
+                <a:ext uri="{FF2B5EF4-FFF2-40B4-BE49-F238E27FC236}">
+                  <a16:creationId xmlns:a16="http://schemas.microsoft.com/office/drawing/2014/main" id="{72D63D19-2C4B-4AAE-AD78-97493B87EBD0}"/>
+                </a:ext>
+              </a:extLst>
+            </p:cNvPr>
+            <p:cNvGrpSpPr/>
+            <p:nvPr/>
+          </p:nvGrpSpPr>
+          <p:grpSpPr>
+            <a:xfrm>
+              <a:off x="1927935" y="594352"/>
+              <a:ext cx="2412571" cy="342900"/>
+              <a:chOff x="1927935" y="594352"/>
+              <a:chExt cx="2412571" cy="342900"/>
+            </a:xfrm>
+          </p:grpSpPr>
+          <p:sp>
+            <p:nvSpPr>
+              <p:cNvPr id="5" name="Frame 4">
+                <a:extLst>
+                  <a:ext uri="{FF2B5EF4-FFF2-40B4-BE49-F238E27FC236}">
+                    <a16:creationId xmlns:a16="http://schemas.microsoft.com/office/drawing/2014/main" id="{DE3E0079-E56C-4414-8F41-D8EEC1073BF5}"/>
+                  </a:ext>
+                </a:extLst>
+              </p:cNvPr>
+              <p:cNvSpPr/>
+              <p:nvPr/>
+            </p:nvSpPr>
+            <p:spPr>
+              <a:xfrm>
+                <a:off x="1927935" y="632460"/>
+                <a:ext cx="572198" cy="304792"/>
+              </a:xfrm>
+              <a:prstGeom prst="frame">
+                <a:avLst>
+                  <a:gd name="adj1" fmla="val 7890"/>
+                </a:avLst>
+              </a:prstGeom>
+              <a:solidFill>
+                <a:srgbClr val="FC3737"/>
+              </a:solidFill>
+              <a:ln>
+                <a:noFill/>
+              </a:ln>
+            </p:spPr>
+            <p:style>
+              <a:lnRef idx="2">
+                <a:schemeClr val="accent1">
+                  <a:shade val="50000"/>
+                </a:schemeClr>
+              </a:lnRef>
+              <a:fillRef idx="1">
+                <a:schemeClr val="accent1"/>
+              </a:fillRef>
+              <a:effectRef idx="0">
+                <a:schemeClr val="accent1"/>
+              </a:effectRef>
+              <a:fontRef idx="minor">
+                <a:schemeClr val="lt1"/>
+              </a:fontRef>
+            </p:style>
+            <p:txBody>
+              <a:bodyPr rtlCol="0" anchor="ctr"/>
+              <a:lstStyle/>
+              <a:p>
+                <a:pPr algn="ctr"/>
+                <a:endParaRPr lang="en-SG">
+                  <a:solidFill>
+                    <a:schemeClr val="tx1"/>
+                  </a:solidFill>
+                </a:endParaRPr>
+              </a:p>
+            </p:txBody>
+          </p:sp>
+          <p:cxnSp>
+            <p:nvCxnSpPr>
+              <p:cNvPr id="6" name="Straight Arrow Connector 5">
+                <a:extLst>
+                  <a:ext uri="{FF2B5EF4-FFF2-40B4-BE49-F238E27FC236}">
+                    <a16:creationId xmlns:a16="http://schemas.microsoft.com/office/drawing/2014/main" id="{F53D71B7-FAF4-4624-AA61-E81CC4730524}"/>
+                  </a:ext>
+                </a:extLst>
+              </p:cNvPr>
+              <p:cNvCxnSpPr>
+                <a:cxnSpLocks/>
+              </p:cNvCxnSpPr>
+              <p:nvPr/>
+            </p:nvCxnSpPr>
+            <p:spPr>
+              <a:xfrm flipH="1">
+                <a:off x="2500133" y="804239"/>
+                <a:ext cx="435326" cy="0"/>
+              </a:xfrm>
+              <a:prstGeom prst="straightConnector1">
+                <a:avLst/>
+              </a:prstGeom>
+              <a:ln>
+                <a:solidFill>
+                  <a:schemeClr val="tx2"/>
+                </a:solidFill>
+                <a:tailEnd type="triangle"/>
+              </a:ln>
+            </p:spPr>
+            <p:style>
+              <a:lnRef idx="3">
+                <a:schemeClr val="dk1"/>
+              </a:lnRef>
+              <a:fillRef idx="0">
+                <a:schemeClr val="dk1"/>
+              </a:fillRef>
+              <a:effectRef idx="2">
+                <a:schemeClr val="dk1"/>
+              </a:effectRef>
+              <a:fontRef idx="minor">
+                <a:schemeClr val="tx1"/>
+              </a:fontRef>
+            </p:style>
+          </p:cxnSp>
+          <p:sp>
+            <p:nvSpPr>
+              <p:cNvPr id="7" name="Rectangle 6">
+                <a:extLst>
+                  <a:ext uri="{FF2B5EF4-FFF2-40B4-BE49-F238E27FC236}">
+                    <a16:creationId xmlns:a16="http://schemas.microsoft.com/office/drawing/2014/main" id="{73E51EC4-1B02-483F-AC14-4C9EEC15BA20}"/>
+                  </a:ext>
+                </a:extLst>
+              </p:cNvPr>
+              <p:cNvSpPr/>
+              <p:nvPr/>
+            </p:nvSpPr>
+            <p:spPr>
+              <a:xfrm>
+                <a:off x="2936411" y="594352"/>
+                <a:ext cx="1404095" cy="342897"/>
+              </a:xfrm>
+              <a:prstGeom prst="rect">
+                <a:avLst/>
+              </a:prstGeom>
+              <a:solidFill>
+                <a:schemeClr val="tx2"/>
+              </a:solidFill>
+              <a:ln>
+                <a:noFill/>
+              </a:ln>
+            </p:spPr>
+            <p:style>
+              <a:lnRef idx="2">
+                <a:schemeClr val="accent1">
+                  <a:shade val="50000"/>
+                </a:schemeClr>
+              </a:lnRef>
+              <a:fillRef idx="1">
+                <a:schemeClr val="accent1"/>
+              </a:fillRef>
+              <a:effectRef idx="0">
+                <a:schemeClr val="accent1"/>
+              </a:effectRef>
+              <a:fontRef idx="minor">
+                <a:schemeClr val="lt1"/>
+              </a:fontRef>
+            </p:style>
+            <p:txBody>
+              <a:bodyPr rtlCol="0" anchor="ctr"/>
+              <a:lstStyle/>
+              <a:p>
+                <a:pPr algn="ctr"/>
+                <a:r>
+                  <a:rPr lang="en-US" sz="1200" dirty="0"/>
+                  <a:t>Your input</a:t>
+                </a:r>
+                <a:endParaRPr lang="en-SG" sz="1200" dirty="0"/>
+              </a:p>
+            </p:txBody>
+          </p:sp>
+        </p:grpSp>
+      </p:grpSp>
+    </p:spTree>
+    <p:extLst>
+      <p:ext uri="{BB962C8B-B14F-4D97-AF65-F5344CB8AC3E}">
+        <p14:creationId xmlns:p14="http://schemas.microsoft.com/office/powerpoint/2010/main" val="2605957869"/>
+      </p:ext>
+    </p:extLst>
+  </p:cSld>
+  <p:clrMapOvr>
+    <a:masterClrMapping/>
+  </p:clrMapOvr>
+</p:sld>
+</file>
+
+<file path=ppt/slides/slide4.xml><?xml version="1.0" encoding="utf-8"?>
+<p:sld xmlns:a="http://schemas.openxmlformats.org/drawingml/2006/main" xmlns:r="http://schemas.openxmlformats.org/officeDocument/2006/relationships" xmlns:p="http://schemas.openxmlformats.org/presentationml/2006/main">
+  <p:cSld>
+    <p:spTree>
+      <p:nvGrpSpPr>
+        <p:cNvPr id="1" name=""/>
+        <p:cNvGrpSpPr/>
+        <p:nvPr/>
+      </p:nvGrpSpPr>
+      <p:grpSpPr>
+        <a:xfrm>
+          <a:off x="0" y="0"/>
+          <a:ext cx="0" cy="0"/>
+          <a:chOff x="0" y="0"/>
+          <a:chExt cx="0" cy="0"/>
+        </a:xfrm>
+      </p:grpSpPr>
+      <p:grpSp>
+        <p:nvGrpSpPr>
+          <p:cNvPr id="4" name="Group 3">
+            <a:extLst>
+              <a:ext uri="{FF2B5EF4-FFF2-40B4-BE49-F238E27FC236}">
+                <a16:creationId xmlns:a16="http://schemas.microsoft.com/office/drawing/2014/main" id="{91214CD7-A07B-4677-AFFC-FD257B37624E}"/>
+              </a:ext>
+            </a:extLst>
+          </p:cNvPr>
+          <p:cNvGrpSpPr/>
+          <p:nvPr/>
+        </p:nvGrpSpPr>
+        <p:grpSpPr>
+          <a:xfrm>
+            <a:off x="1826185" y="0"/>
+            <a:ext cx="8539629" cy="6858000"/>
+            <a:chOff x="1826185" y="0"/>
+            <a:chExt cx="8539629" cy="6858000"/>
+          </a:xfrm>
+        </p:grpSpPr>
+        <p:pic>
+          <p:nvPicPr>
+            <p:cNvPr id="2" name="Picture 1">
+              <a:extLst>
+                <a:ext uri="{FF2B5EF4-FFF2-40B4-BE49-F238E27FC236}">
+                  <a16:creationId xmlns:a16="http://schemas.microsoft.com/office/drawing/2014/main" id="{49B30CCE-1115-4727-8B85-3B4F1CC06D18}"/>
+                </a:ext>
+              </a:extLst>
+            </p:cNvPr>
+            <p:cNvPicPr>
+              <a:picLocks noChangeAspect="1"/>
+            </p:cNvPicPr>
+            <p:nvPr/>
+          </p:nvPicPr>
+          <p:blipFill>
+            <a:blip r:embed="rId2"/>
+            <a:stretch>
+              <a:fillRect/>
+            </a:stretch>
+          </p:blipFill>
+          <p:spPr>
+            <a:xfrm>
+              <a:off x="1826185" y="0"/>
+              <a:ext cx="8539629" cy="6858000"/>
+            </a:xfrm>
+            <a:prstGeom prst="rect">
+              <a:avLst/>
+            </a:prstGeom>
+          </p:spPr>
+        </p:pic>
+        <p:grpSp>
+          <p:nvGrpSpPr>
+            <p:cNvPr id="3" name="Group 2">
+              <a:extLst>
+                <a:ext uri="{FF2B5EF4-FFF2-40B4-BE49-F238E27FC236}">
+                  <a16:creationId xmlns:a16="http://schemas.microsoft.com/office/drawing/2014/main" id="{8DFD4FA4-2714-49F1-AA66-0075FCF22199}"/>
+                </a:ext>
+              </a:extLst>
+            </p:cNvPr>
+            <p:cNvGrpSpPr/>
+            <p:nvPr/>
+          </p:nvGrpSpPr>
+          <p:grpSpPr>
+            <a:xfrm>
+              <a:off x="1927934" y="407670"/>
+              <a:ext cx="8327236" cy="5924550"/>
+              <a:chOff x="1927934" y="407670"/>
+              <a:chExt cx="8327236" cy="5924550"/>
+            </a:xfrm>
+          </p:grpSpPr>
+          <p:sp>
+            <p:nvSpPr>
+              <p:cNvPr id="7" name="Frame 6">
+                <a:extLst>
+                  <a:ext uri="{FF2B5EF4-FFF2-40B4-BE49-F238E27FC236}">
+                    <a16:creationId xmlns:a16="http://schemas.microsoft.com/office/drawing/2014/main" id="{0B8E9A91-B1DA-448D-944C-E29A470143E2}"/>
                   </a:ext>
                 </a:extLst>
               </p:cNvPr>
@@ -3738,12 +4438,112 @@
               </a:p>
             </p:txBody>
           </p:sp>
+          <p:cxnSp>
+            <p:nvCxnSpPr>
+              <p:cNvPr id="8" name="Straight Arrow Connector 7">
+                <a:extLst>
+                  <a:ext uri="{FF2B5EF4-FFF2-40B4-BE49-F238E27FC236}">
+                    <a16:creationId xmlns:a16="http://schemas.microsoft.com/office/drawing/2014/main" id="{2006BAEE-A600-44E6-BBC1-4916BEFF946C}"/>
+                  </a:ext>
+                </a:extLst>
+              </p:cNvPr>
+              <p:cNvCxnSpPr>
+                <a:cxnSpLocks/>
+              </p:cNvCxnSpPr>
+              <p:nvPr/>
+            </p:nvCxnSpPr>
+            <p:spPr>
+              <a:xfrm>
+                <a:off x="5128742" y="720090"/>
+                <a:ext cx="0" cy="342900"/>
+              </a:xfrm>
+              <a:prstGeom prst="straightConnector1">
+                <a:avLst/>
+              </a:prstGeom>
+              <a:ln>
+                <a:solidFill>
+                  <a:schemeClr val="tx2"/>
+                </a:solidFill>
+                <a:tailEnd type="triangle"/>
+              </a:ln>
+            </p:spPr>
+            <p:style>
+              <a:lnRef idx="3">
+                <a:schemeClr val="dk1"/>
+              </a:lnRef>
+              <a:fillRef idx="0">
+                <a:schemeClr val="dk1"/>
+              </a:fillRef>
+              <a:effectRef idx="2">
+                <a:schemeClr val="dk1"/>
+              </a:effectRef>
+              <a:fontRef idx="minor">
+                <a:schemeClr val="tx1"/>
+              </a:fontRef>
+            </p:style>
+          </p:cxnSp>
           <p:sp>
             <p:nvSpPr>
-              <p:cNvPr id="13" name="Frame 12">
+              <p:cNvPr id="9" name="Rectangle 8">
                 <a:extLst>
                   <a:ext uri="{FF2B5EF4-FFF2-40B4-BE49-F238E27FC236}">
-                    <a16:creationId xmlns:a16="http://schemas.microsoft.com/office/drawing/2014/main" id="{69339133-591A-4ACB-A20F-47351E688EDF}"/>
+                    <a16:creationId xmlns:a16="http://schemas.microsoft.com/office/drawing/2014/main" id="{34C6C681-A747-4879-8554-AF95B47967CC}"/>
+                  </a:ext>
+                </a:extLst>
+              </p:cNvPr>
+              <p:cNvSpPr/>
+              <p:nvPr/>
+            </p:nvSpPr>
+            <p:spPr>
+              <a:xfrm>
+                <a:off x="4054322" y="407670"/>
+                <a:ext cx="2148840" cy="342900"/>
+              </a:xfrm>
+              <a:prstGeom prst="rect">
+                <a:avLst/>
+              </a:prstGeom>
+              <a:solidFill>
+                <a:schemeClr val="tx2"/>
+              </a:solidFill>
+              <a:ln>
+                <a:noFill/>
+              </a:ln>
+            </p:spPr>
+            <p:style>
+              <a:lnRef idx="2">
+                <a:schemeClr val="accent1">
+                  <a:shade val="50000"/>
+                </a:schemeClr>
+              </a:lnRef>
+              <a:fillRef idx="1">
+                <a:schemeClr val="accent1"/>
+              </a:fillRef>
+              <a:effectRef idx="0">
+                <a:schemeClr val="accent1"/>
+              </a:effectRef>
+              <a:fontRef idx="minor">
+                <a:schemeClr val="lt1"/>
+              </a:fontRef>
+            </p:style>
+            <p:txBody>
+              <a:bodyPr rtlCol="0" anchor="ctr"/>
+              <a:lstStyle/>
+              <a:p>
+                <a:pPr algn="ctr"/>
+                <a:r>
+                  <a:rPr lang="en-US" sz="1200" dirty="0"/>
+                  <a:t>A success message is displayed</a:t>
+                </a:r>
+                <a:endParaRPr lang="en-SG" sz="1200" dirty="0"/>
+              </a:p>
+            </p:txBody>
+          </p:sp>
+          <p:sp>
+            <p:nvSpPr>
+              <p:cNvPr id="10" name="Frame 9">
+                <a:extLst>
+                  <a:ext uri="{FF2B5EF4-FFF2-40B4-BE49-F238E27FC236}">
+                    <a16:creationId xmlns:a16="http://schemas.microsoft.com/office/drawing/2014/main" id="{DB3D27F9-C82C-40EE-8D11-E8707546FBA5}"/>
                   </a:ext>
                 </a:extLst>
               </p:cNvPr>
@@ -3753,7 +4553,7 @@
             <p:spPr>
               <a:xfrm>
                 <a:off x="1927934" y="5379720"/>
-                <a:ext cx="8191426" cy="952500"/>
+                <a:ext cx="8327236" cy="952500"/>
               </a:xfrm>
               <a:prstGeom prst="frame">
                 <a:avLst>
@@ -3796,845 +4596,108 @@
               </a:p>
             </p:txBody>
           </p:sp>
-        </p:grpSp>
-        <p:cxnSp>
-          <p:nvCxnSpPr>
-            <p:cNvPr id="17" name="Straight Arrow Connector 16">
-              <a:extLst>
-                <a:ext uri="{FF2B5EF4-FFF2-40B4-BE49-F238E27FC236}">
-                  <a16:creationId xmlns:a16="http://schemas.microsoft.com/office/drawing/2014/main" id="{08F32483-5C66-4573-A74B-C9B2EFE28688}"/>
-                </a:ext>
-              </a:extLst>
-            </p:cNvPr>
-            <p:cNvCxnSpPr>
-              <a:cxnSpLocks/>
-            </p:cNvCxnSpPr>
-            <p:nvPr/>
-          </p:nvCxnSpPr>
-          <p:spPr>
-            <a:xfrm>
-              <a:off x="5128742" y="720090"/>
-              <a:ext cx="0" cy="342900"/>
-            </a:xfrm>
-            <a:prstGeom prst="straightConnector1">
-              <a:avLst/>
-            </a:prstGeom>
-            <a:ln>
+          <p:cxnSp>
+            <p:nvCxnSpPr>
+              <p:cNvPr id="11" name="Straight Arrow Connector 10">
+                <a:extLst>
+                  <a:ext uri="{FF2B5EF4-FFF2-40B4-BE49-F238E27FC236}">
+                    <a16:creationId xmlns:a16="http://schemas.microsoft.com/office/drawing/2014/main" id="{2BC29DAF-C016-45CC-8616-FE291BF29665}"/>
+                  </a:ext>
+                </a:extLst>
+              </p:cNvPr>
+              <p:cNvCxnSpPr>
+                <a:cxnSpLocks/>
+                <a:stCxn id="12" idx="2"/>
+              </p:cNvCxnSpPr>
+              <p:nvPr/>
+            </p:nvCxnSpPr>
+            <p:spPr>
+              <a:xfrm>
+                <a:off x="7134225" y="5105400"/>
+                <a:ext cx="0" cy="274320"/>
+              </a:xfrm>
+              <a:prstGeom prst="straightConnector1">
+                <a:avLst/>
+              </a:prstGeom>
+              <a:ln>
+                <a:solidFill>
+                  <a:schemeClr val="tx2"/>
+                </a:solidFill>
+                <a:tailEnd type="triangle"/>
+              </a:ln>
+            </p:spPr>
+            <p:style>
+              <a:lnRef idx="3">
+                <a:schemeClr val="dk1"/>
+              </a:lnRef>
+              <a:fillRef idx="0">
+                <a:schemeClr val="dk1"/>
+              </a:fillRef>
+              <a:effectRef idx="2">
+                <a:schemeClr val="dk1"/>
+              </a:effectRef>
+              <a:fontRef idx="minor">
+                <a:schemeClr val="tx1"/>
+              </a:fontRef>
+            </p:style>
+          </p:cxnSp>
+          <p:sp>
+            <p:nvSpPr>
+              <p:cNvPr id="12" name="Rectangle 11">
+                <a:extLst>
+                  <a:ext uri="{FF2B5EF4-FFF2-40B4-BE49-F238E27FC236}">
+                    <a16:creationId xmlns:a16="http://schemas.microsoft.com/office/drawing/2014/main" id="{C115A327-A61B-46F9-8DB9-1588E33EB3A3}"/>
+                  </a:ext>
+                </a:extLst>
+              </p:cNvPr>
+              <p:cNvSpPr/>
+              <p:nvPr/>
+            </p:nvSpPr>
+            <p:spPr>
+              <a:xfrm>
+                <a:off x="5894070" y="4663440"/>
+                <a:ext cx="2480310" cy="441960"/>
+              </a:xfrm>
+              <a:prstGeom prst="rect">
+                <a:avLst/>
+              </a:prstGeom>
               <a:solidFill>
                 <a:schemeClr val="tx2"/>
               </a:solidFill>
-              <a:tailEnd type="triangle"/>
-            </a:ln>
-          </p:spPr>
-          <p:style>
-            <a:lnRef idx="3">
-              <a:schemeClr val="dk1"/>
-            </a:lnRef>
-            <a:fillRef idx="0">
-              <a:schemeClr val="dk1"/>
-            </a:fillRef>
-            <a:effectRef idx="2">
-              <a:schemeClr val="dk1"/>
-            </a:effectRef>
-            <a:fontRef idx="minor">
-              <a:schemeClr val="tx1"/>
-            </a:fontRef>
-          </p:style>
-        </p:cxnSp>
-        <p:sp>
-          <p:nvSpPr>
-            <p:cNvPr id="15" name="Rectangle 14">
-              <a:extLst>
-                <a:ext uri="{FF2B5EF4-FFF2-40B4-BE49-F238E27FC236}">
-                  <a16:creationId xmlns:a16="http://schemas.microsoft.com/office/drawing/2014/main" id="{68646DD1-E1A2-4914-B6B8-C1B477191D1A}"/>
-                </a:ext>
-              </a:extLst>
-            </p:cNvPr>
-            <p:cNvSpPr/>
-            <p:nvPr/>
-          </p:nvSpPr>
-          <p:spPr>
-            <a:xfrm>
-              <a:off x="4054322" y="407670"/>
-              <a:ext cx="2148840" cy="342900"/>
-            </a:xfrm>
-            <a:prstGeom prst="rect">
-              <a:avLst/>
-            </a:prstGeom>
-            <a:solidFill>
-              <a:schemeClr val="tx2"/>
-            </a:solidFill>
-            <a:ln>
-              <a:noFill/>
-            </a:ln>
-          </p:spPr>
-          <p:style>
-            <a:lnRef idx="2">
-              <a:schemeClr val="accent1">
-                <a:shade val="50000"/>
-              </a:schemeClr>
-            </a:lnRef>
-            <a:fillRef idx="1">
-              <a:schemeClr val="accent1"/>
-            </a:fillRef>
-            <a:effectRef idx="0">
-              <a:schemeClr val="accent1"/>
-            </a:effectRef>
-            <a:fontRef idx="minor">
-              <a:schemeClr val="lt1"/>
-            </a:fontRef>
-          </p:style>
-          <p:txBody>
-            <a:bodyPr rtlCol="0" anchor="ctr"/>
-            <a:lstStyle/>
-            <a:p>
-              <a:pPr algn="ctr"/>
-              <a:r>
-                <a:rPr lang="en-US" sz="1200" dirty="0"/>
-                <a:t>A success message is displayed</a:t>
-              </a:r>
-              <a:endParaRPr lang="en-SG" sz="1200" dirty="0"/>
-            </a:p>
-          </p:txBody>
-        </p:sp>
-        <p:cxnSp>
-          <p:nvCxnSpPr>
-            <p:cNvPr id="22" name="Straight Arrow Connector 21">
-              <a:extLst>
-                <a:ext uri="{FF2B5EF4-FFF2-40B4-BE49-F238E27FC236}">
-                  <a16:creationId xmlns:a16="http://schemas.microsoft.com/office/drawing/2014/main" id="{77A9152A-57A1-4FA2-B75A-74AEB74DE939}"/>
-                </a:ext>
-              </a:extLst>
-            </p:cNvPr>
-            <p:cNvCxnSpPr>
-              <a:cxnSpLocks/>
-              <a:stCxn id="21" idx="2"/>
-            </p:cNvCxnSpPr>
-            <p:nvPr/>
-          </p:nvCxnSpPr>
-          <p:spPr>
-            <a:xfrm>
-              <a:off x="7026325" y="5105400"/>
-              <a:ext cx="0" cy="274320"/>
-            </a:xfrm>
-            <a:prstGeom prst="straightConnector1">
-              <a:avLst/>
-            </a:prstGeom>
-            <a:ln>
-              <a:solidFill>
-                <a:schemeClr val="tx2"/>
-              </a:solidFill>
-              <a:tailEnd type="triangle"/>
-            </a:ln>
-          </p:spPr>
-          <p:style>
-            <a:lnRef idx="3">
-              <a:schemeClr val="dk1"/>
-            </a:lnRef>
-            <a:fillRef idx="0">
-              <a:schemeClr val="dk1"/>
-            </a:fillRef>
-            <a:effectRef idx="2">
-              <a:schemeClr val="dk1"/>
-            </a:effectRef>
-            <a:fontRef idx="minor">
-              <a:schemeClr val="tx1"/>
-            </a:fontRef>
-          </p:style>
-        </p:cxnSp>
-        <p:sp>
-          <p:nvSpPr>
-            <p:cNvPr id="21" name="Rectangle 20">
-              <a:extLst>
-                <a:ext uri="{FF2B5EF4-FFF2-40B4-BE49-F238E27FC236}">
-                  <a16:creationId xmlns:a16="http://schemas.microsoft.com/office/drawing/2014/main" id="{E02C06DD-34FD-4E05-BD92-44282B030013}"/>
-                </a:ext>
-              </a:extLst>
-            </p:cNvPr>
-            <p:cNvSpPr/>
-            <p:nvPr/>
-          </p:nvSpPr>
-          <p:spPr>
-            <a:xfrm>
-              <a:off x="5973969" y="4643021"/>
-              <a:ext cx="2104711" cy="462379"/>
-            </a:xfrm>
-            <a:prstGeom prst="rect">
-              <a:avLst/>
-            </a:prstGeom>
-            <a:solidFill>
-              <a:schemeClr val="tx2"/>
-            </a:solidFill>
-            <a:ln>
-              <a:noFill/>
-            </a:ln>
-          </p:spPr>
-          <p:style>
-            <a:lnRef idx="2">
-              <a:schemeClr val="accent1">
-                <a:shade val="50000"/>
-              </a:schemeClr>
-            </a:lnRef>
-            <a:fillRef idx="1">
-              <a:schemeClr val="accent1"/>
-            </a:fillRef>
-            <a:effectRef idx="0">
-              <a:schemeClr val="accent1"/>
-            </a:effectRef>
-            <a:fontRef idx="minor">
-              <a:schemeClr val="lt1"/>
-            </a:fontRef>
-          </p:style>
-          <p:txBody>
-            <a:bodyPr rtlCol="0" anchor="ctr"/>
-            <a:lstStyle/>
-            <a:p>
-              <a:pPr algn="ctr"/>
-              <a:r>
-                <a:rPr lang="en-US" sz="1200" dirty="0"/>
-                <a:t>The deleted transaction adds back to the list</a:t>
-              </a:r>
-              <a:endParaRPr lang="en-SG" sz="1200" dirty="0"/>
-            </a:p>
-          </p:txBody>
-        </p:sp>
-      </p:grpSp>
-    </p:spTree>
-    <p:extLst>
-      <p:ext uri="{BB962C8B-B14F-4D97-AF65-F5344CB8AC3E}">
-        <p14:creationId xmlns:p14="http://schemas.microsoft.com/office/powerpoint/2010/main" val="3237955224"/>
-      </p:ext>
-    </p:extLst>
-  </p:cSld>
-  <p:clrMapOvr>
-    <a:masterClrMapping/>
-  </p:clrMapOvr>
-</p:sld>
-</file>
-
-<file path=ppt/slides/slide3.xml><?xml version="1.0" encoding="utf-8"?>
-<p:sld xmlns:a="http://schemas.openxmlformats.org/drawingml/2006/main" xmlns:r="http://schemas.openxmlformats.org/officeDocument/2006/relationships" xmlns:p="http://schemas.openxmlformats.org/presentationml/2006/main">
-  <p:cSld>
-    <p:spTree>
-      <p:nvGrpSpPr>
-        <p:cNvPr id="1" name=""/>
-        <p:cNvGrpSpPr/>
-        <p:nvPr/>
-      </p:nvGrpSpPr>
-      <p:grpSpPr>
-        <a:xfrm>
-          <a:off x="0" y="0"/>
-          <a:ext cx="0" cy="0"/>
-          <a:chOff x="0" y="0"/>
-          <a:chExt cx="0" cy="0"/>
-        </a:xfrm>
-      </p:grpSpPr>
-      <p:grpSp>
-        <p:nvGrpSpPr>
-          <p:cNvPr id="9" name="Group 8">
-            <a:extLst>
-              <a:ext uri="{FF2B5EF4-FFF2-40B4-BE49-F238E27FC236}">
-                <a16:creationId xmlns:a16="http://schemas.microsoft.com/office/drawing/2014/main" id="{72D63D19-2C4B-4AAE-AD78-97493B87EBD0}"/>
-              </a:ext>
-            </a:extLst>
-          </p:cNvPr>
-          <p:cNvGrpSpPr/>
-          <p:nvPr/>
-        </p:nvGrpSpPr>
-        <p:grpSpPr>
-          <a:xfrm>
-            <a:off x="1830490" y="0"/>
-            <a:ext cx="8531020" cy="6858000"/>
-            <a:chOff x="1830490" y="0"/>
-            <a:chExt cx="8531020" cy="6858000"/>
-          </a:xfrm>
-        </p:grpSpPr>
-        <p:pic>
-          <p:nvPicPr>
-            <p:cNvPr id="8" name="Picture 7">
-              <a:extLst>
-                <a:ext uri="{FF2B5EF4-FFF2-40B4-BE49-F238E27FC236}">
-                  <a16:creationId xmlns:a16="http://schemas.microsoft.com/office/drawing/2014/main" id="{64CC08C1-8819-4B5B-A0FE-A6A130DC97DD}"/>
-                </a:ext>
-              </a:extLst>
-            </p:cNvPr>
-            <p:cNvPicPr>
-              <a:picLocks noChangeAspect="1"/>
-            </p:cNvPicPr>
-            <p:nvPr/>
-          </p:nvPicPr>
-          <p:blipFill>
-            <a:blip r:embed="rId2"/>
-            <a:stretch>
-              <a:fillRect/>
-            </a:stretch>
-          </p:blipFill>
-          <p:spPr>
-            <a:xfrm>
-              <a:off x="1830490" y="0"/>
-              <a:ext cx="8531020" cy="6858000"/>
-            </a:xfrm>
-            <a:prstGeom prst="rect">
-              <a:avLst/>
-            </a:prstGeom>
-          </p:spPr>
-        </p:pic>
-        <p:sp>
-          <p:nvSpPr>
-            <p:cNvPr id="5" name="Frame 4">
-              <a:extLst>
-                <a:ext uri="{FF2B5EF4-FFF2-40B4-BE49-F238E27FC236}">
-                  <a16:creationId xmlns:a16="http://schemas.microsoft.com/office/drawing/2014/main" id="{DE3E0079-E56C-4414-8F41-D8EEC1073BF5}"/>
-                </a:ext>
-              </a:extLst>
-            </p:cNvPr>
-            <p:cNvSpPr/>
-            <p:nvPr/>
-          </p:nvSpPr>
-          <p:spPr>
-            <a:xfrm>
-              <a:off x="1927935" y="632460"/>
-              <a:ext cx="572198" cy="304792"/>
-            </a:xfrm>
-            <a:prstGeom prst="frame">
-              <a:avLst>
-                <a:gd name="adj1" fmla="val 7890"/>
-              </a:avLst>
-            </a:prstGeom>
-            <a:solidFill>
-              <a:srgbClr val="FC3737"/>
-            </a:solidFill>
-            <a:ln>
-              <a:noFill/>
-            </a:ln>
-          </p:spPr>
-          <p:style>
-            <a:lnRef idx="2">
-              <a:schemeClr val="accent1">
-                <a:shade val="50000"/>
-              </a:schemeClr>
-            </a:lnRef>
-            <a:fillRef idx="1">
-              <a:schemeClr val="accent1"/>
-            </a:fillRef>
-            <a:effectRef idx="0">
-              <a:schemeClr val="accent1"/>
-            </a:effectRef>
-            <a:fontRef idx="minor">
-              <a:schemeClr val="lt1"/>
-            </a:fontRef>
-          </p:style>
-          <p:txBody>
-            <a:bodyPr rtlCol="0" anchor="ctr"/>
-            <a:lstStyle/>
-            <a:p>
-              <a:pPr algn="ctr"/>
-              <a:endParaRPr lang="en-SG">
-                <a:solidFill>
-                  <a:schemeClr val="tx1"/>
-                </a:solidFill>
-              </a:endParaRPr>
-            </a:p>
-          </p:txBody>
-        </p:sp>
-        <p:cxnSp>
-          <p:nvCxnSpPr>
-            <p:cNvPr id="6" name="Straight Arrow Connector 5">
-              <a:extLst>
-                <a:ext uri="{FF2B5EF4-FFF2-40B4-BE49-F238E27FC236}">
-                  <a16:creationId xmlns:a16="http://schemas.microsoft.com/office/drawing/2014/main" id="{F53D71B7-FAF4-4624-AA61-E81CC4730524}"/>
-                </a:ext>
-              </a:extLst>
-            </p:cNvPr>
-            <p:cNvCxnSpPr>
-              <a:cxnSpLocks/>
-            </p:cNvCxnSpPr>
-            <p:nvPr/>
-          </p:nvCxnSpPr>
-          <p:spPr>
-            <a:xfrm flipH="1">
-              <a:off x="2500133" y="804239"/>
-              <a:ext cx="435326" cy="0"/>
-            </a:xfrm>
-            <a:prstGeom prst="straightConnector1">
-              <a:avLst/>
-            </a:prstGeom>
-            <a:ln>
-              <a:solidFill>
-                <a:schemeClr val="tx2"/>
-              </a:solidFill>
-              <a:tailEnd type="triangle"/>
-            </a:ln>
-          </p:spPr>
-          <p:style>
-            <a:lnRef idx="3">
-              <a:schemeClr val="dk1"/>
-            </a:lnRef>
-            <a:fillRef idx="0">
-              <a:schemeClr val="dk1"/>
-            </a:fillRef>
-            <a:effectRef idx="2">
-              <a:schemeClr val="dk1"/>
-            </a:effectRef>
-            <a:fontRef idx="minor">
-              <a:schemeClr val="tx1"/>
-            </a:fontRef>
-          </p:style>
-        </p:cxnSp>
-        <p:sp>
-          <p:nvSpPr>
-            <p:cNvPr id="7" name="Rectangle 6">
-              <a:extLst>
-                <a:ext uri="{FF2B5EF4-FFF2-40B4-BE49-F238E27FC236}">
-                  <a16:creationId xmlns:a16="http://schemas.microsoft.com/office/drawing/2014/main" id="{73E51EC4-1B02-483F-AC14-4C9EEC15BA20}"/>
-                </a:ext>
-              </a:extLst>
-            </p:cNvPr>
-            <p:cNvSpPr/>
-            <p:nvPr/>
-          </p:nvSpPr>
-          <p:spPr>
-            <a:xfrm>
-              <a:off x="2936411" y="594352"/>
-              <a:ext cx="1404095" cy="342897"/>
-            </a:xfrm>
-            <a:prstGeom prst="rect">
-              <a:avLst/>
-            </a:prstGeom>
-            <a:solidFill>
-              <a:schemeClr val="tx2"/>
-            </a:solidFill>
-            <a:ln>
-              <a:noFill/>
-            </a:ln>
-          </p:spPr>
-          <p:style>
-            <a:lnRef idx="2">
-              <a:schemeClr val="accent1">
-                <a:shade val="50000"/>
-              </a:schemeClr>
-            </a:lnRef>
-            <a:fillRef idx="1">
-              <a:schemeClr val="accent1"/>
-            </a:fillRef>
-            <a:effectRef idx="0">
-              <a:schemeClr val="accent1"/>
-            </a:effectRef>
-            <a:fontRef idx="minor">
-              <a:schemeClr val="lt1"/>
-            </a:fontRef>
-          </p:style>
-          <p:txBody>
-            <a:bodyPr rtlCol="0" anchor="ctr"/>
-            <a:lstStyle/>
-            <a:p>
-              <a:pPr algn="ctr"/>
-              <a:r>
-                <a:rPr lang="en-US" sz="1200" dirty="0"/>
-                <a:t>Your input</a:t>
-              </a:r>
-              <a:endParaRPr lang="en-SG" sz="1200" dirty="0"/>
-            </a:p>
-          </p:txBody>
-        </p:sp>
-      </p:grpSp>
-    </p:spTree>
-    <p:extLst>
-      <p:ext uri="{BB962C8B-B14F-4D97-AF65-F5344CB8AC3E}">
-        <p14:creationId xmlns:p14="http://schemas.microsoft.com/office/powerpoint/2010/main" val="2605957869"/>
-      </p:ext>
-    </p:extLst>
-  </p:cSld>
-  <p:clrMapOvr>
-    <a:masterClrMapping/>
-  </p:clrMapOvr>
-</p:sld>
-</file>
-
-<file path=ppt/slides/slide4.xml><?xml version="1.0" encoding="utf-8"?>
-<p:sld xmlns:a="http://schemas.openxmlformats.org/drawingml/2006/main" xmlns:r="http://schemas.openxmlformats.org/officeDocument/2006/relationships" xmlns:p="http://schemas.openxmlformats.org/presentationml/2006/main">
-  <p:cSld>
-    <p:spTree>
-      <p:nvGrpSpPr>
-        <p:cNvPr id="1" name=""/>
-        <p:cNvGrpSpPr/>
-        <p:nvPr/>
-      </p:nvGrpSpPr>
-      <p:grpSpPr>
-        <a:xfrm>
-          <a:off x="0" y="0"/>
-          <a:ext cx="0" cy="0"/>
-          <a:chOff x="0" y="0"/>
-          <a:chExt cx="0" cy="0"/>
-        </a:xfrm>
-      </p:grpSpPr>
-      <p:grpSp>
-        <p:nvGrpSpPr>
-          <p:cNvPr id="3" name="Group 2">
-            <a:extLst>
-              <a:ext uri="{FF2B5EF4-FFF2-40B4-BE49-F238E27FC236}">
-                <a16:creationId xmlns:a16="http://schemas.microsoft.com/office/drawing/2014/main" id="{8DFD4FA4-2714-49F1-AA66-0075FCF22199}"/>
-              </a:ext>
-            </a:extLst>
-          </p:cNvPr>
-          <p:cNvGrpSpPr/>
-          <p:nvPr/>
-        </p:nvGrpSpPr>
-        <p:grpSpPr>
-          <a:xfrm>
-            <a:off x="1827033" y="0"/>
-            <a:ext cx="8537933" cy="6858000"/>
-            <a:chOff x="1827033" y="0"/>
-            <a:chExt cx="8537933" cy="6858000"/>
-          </a:xfrm>
-        </p:grpSpPr>
-        <p:pic>
-          <p:nvPicPr>
-            <p:cNvPr id="6" name="Picture 5">
-              <a:extLst>
-                <a:ext uri="{FF2B5EF4-FFF2-40B4-BE49-F238E27FC236}">
-                  <a16:creationId xmlns:a16="http://schemas.microsoft.com/office/drawing/2014/main" id="{136BC17F-7BEF-49A8-8FB0-7DA11F8E6C04}"/>
-                </a:ext>
-              </a:extLst>
-            </p:cNvPr>
-            <p:cNvPicPr>
-              <a:picLocks noChangeAspect="1"/>
-            </p:cNvPicPr>
-            <p:nvPr/>
-          </p:nvPicPr>
-          <p:blipFill>
-            <a:blip r:embed="rId2"/>
-            <a:stretch>
-              <a:fillRect/>
-            </a:stretch>
-          </p:blipFill>
-          <p:spPr>
-            <a:xfrm>
-              <a:off x="1827033" y="0"/>
-              <a:ext cx="8537933" cy="6858000"/>
-            </a:xfrm>
-            <a:prstGeom prst="rect">
-              <a:avLst/>
-            </a:prstGeom>
-          </p:spPr>
-        </p:pic>
-        <p:sp>
-          <p:nvSpPr>
-            <p:cNvPr id="7" name="Frame 6">
-              <a:extLst>
-                <a:ext uri="{FF2B5EF4-FFF2-40B4-BE49-F238E27FC236}">
-                  <a16:creationId xmlns:a16="http://schemas.microsoft.com/office/drawing/2014/main" id="{0B8E9A91-B1DA-448D-944C-E29A470143E2}"/>
-                </a:ext>
-              </a:extLst>
-            </p:cNvPr>
-            <p:cNvSpPr/>
-            <p:nvPr/>
-          </p:nvSpPr>
-          <p:spPr>
-            <a:xfrm>
-              <a:off x="1927934" y="1059180"/>
-              <a:ext cx="5757656" cy="630724"/>
-            </a:xfrm>
-            <a:prstGeom prst="frame">
-              <a:avLst>
-                <a:gd name="adj1" fmla="val 3930"/>
-              </a:avLst>
-            </a:prstGeom>
-            <a:solidFill>
-              <a:srgbClr val="FC3737"/>
-            </a:solidFill>
-            <a:ln>
-              <a:noFill/>
-            </a:ln>
-          </p:spPr>
-          <p:style>
-            <a:lnRef idx="2">
-              <a:schemeClr val="accent1">
-                <a:shade val="50000"/>
-              </a:schemeClr>
-            </a:lnRef>
-            <a:fillRef idx="1">
-              <a:schemeClr val="accent1"/>
-            </a:fillRef>
-            <a:effectRef idx="0">
-              <a:schemeClr val="accent1"/>
-            </a:effectRef>
-            <a:fontRef idx="minor">
-              <a:schemeClr val="lt1"/>
-            </a:fontRef>
-          </p:style>
-          <p:txBody>
-            <a:bodyPr rtlCol="0" anchor="ctr"/>
-            <a:lstStyle/>
-            <a:p>
-              <a:pPr algn="ctr"/>
-              <a:endParaRPr lang="en-SG">
-                <a:solidFill>
-                  <a:schemeClr val="tx1"/>
-                </a:solidFill>
-              </a:endParaRPr>
-            </a:p>
-          </p:txBody>
-        </p:sp>
-        <p:cxnSp>
-          <p:nvCxnSpPr>
-            <p:cNvPr id="8" name="Straight Arrow Connector 7">
-              <a:extLst>
-                <a:ext uri="{FF2B5EF4-FFF2-40B4-BE49-F238E27FC236}">
-                  <a16:creationId xmlns:a16="http://schemas.microsoft.com/office/drawing/2014/main" id="{2006BAEE-A600-44E6-BBC1-4916BEFF946C}"/>
-                </a:ext>
-              </a:extLst>
-            </p:cNvPr>
-            <p:cNvCxnSpPr>
-              <a:cxnSpLocks/>
-            </p:cNvCxnSpPr>
-            <p:nvPr/>
-          </p:nvCxnSpPr>
-          <p:spPr>
-            <a:xfrm>
-              <a:off x="5128742" y="720090"/>
-              <a:ext cx="0" cy="342900"/>
-            </a:xfrm>
-            <a:prstGeom prst="straightConnector1">
-              <a:avLst/>
-            </a:prstGeom>
-            <a:ln>
-              <a:solidFill>
-                <a:schemeClr val="tx2"/>
-              </a:solidFill>
-              <a:tailEnd type="triangle"/>
-            </a:ln>
-          </p:spPr>
-          <p:style>
-            <a:lnRef idx="3">
-              <a:schemeClr val="dk1"/>
-            </a:lnRef>
-            <a:fillRef idx="0">
-              <a:schemeClr val="dk1"/>
-            </a:fillRef>
-            <a:effectRef idx="2">
-              <a:schemeClr val="dk1"/>
-            </a:effectRef>
-            <a:fontRef idx="minor">
-              <a:schemeClr val="tx1"/>
-            </a:fontRef>
-          </p:style>
-        </p:cxnSp>
-        <p:sp>
-          <p:nvSpPr>
-            <p:cNvPr id="9" name="Rectangle 8">
-              <a:extLst>
-                <a:ext uri="{FF2B5EF4-FFF2-40B4-BE49-F238E27FC236}">
-                  <a16:creationId xmlns:a16="http://schemas.microsoft.com/office/drawing/2014/main" id="{34C6C681-A747-4879-8554-AF95B47967CC}"/>
-                </a:ext>
-              </a:extLst>
-            </p:cNvPr>
-            <p:cNvSpPr/>
-            <p:nvPr/>
-          </p:nvSpPr>
-          <p:spPr>
-            <a:xfrm>
-              <a:off x="4054322" y="407670"/>
-              <a:ext cx="2148840" cy="342900"/>
-            </a:xfrm>
-            <a:prstGeom prst="rect">
-              <a:avLst/>
-            </a:prstGeom>
-            <a:solidFill>
-              <a:schemeClr val="tx2"/>
-            </a:solidFill>
-            <a:ln>
-              <a:noFill/>
-            </a:ln>
-          </p:spPr>
-          <p:style>
-            <a:lnRef idx="2">
-              <a:schemeClr val="accent1">
-                <a:shade val="50000"/>
-              </a:schemeClr>
-            </a:lnRef>
-            <a:fillRef idx="1">
-              <a:schemeClr val="accent1"/>
-            </a:fillRef>
-            <a:effectRef idx="0">
-              <a:schemeClr val="accent1"/>
-            </a:effectRef>
-            <a:fontRef idx="minor">
-              <a:schemeClr val="lt1"/>
-            </a:fontRef>
-          </p:style>
-          <p:txBody>
-            <a:bodyPr rtlCol="0" anchor="ctr"/>
-            <a:lstStyle/>
-            <a:p>
-              <a:pPr algn="ctr"/>
-              <a:r>
-                <a:rPr lang="en-US" sz="1200" dirty="0"/>
-                <a:t>A success message is displayed</a:t>
-              </a:r>
-              <a:endParaRPr lang="en-SG" sz="1200" dirty="0"/>
-            </a:p>
-          </p:txBody>
-        </p:sp>
-        <p:sp>
-          <p:nvSpPr>
-            <p:cNvPr id="10" name="Frame 9">
-              <a:extLst>
-                <a:ext uri="{FF2B5EF4-FFF2-40B4-BE49-F238E27FC236}">
-                  <a16:creationId xmlns:a16="http://schemas.microsoft.com/office/drawing/2014/main" id="{DB3D27F9-C82C-40EE-8D11-E8707546FBA5}"/>
-                </a:ext>
-              </a:extLst>
-            </p:cNvPr>
-            <p:cNvSpPr/>
-            <p:nvPr/>
-          </p:nvSpPr>
-          <p:spPr>
-            <a:xfrm>
-              <a:off x="1927934" y="5379720"/>
-              <a:ext cx="8327236" cy="952500"/>
-            </a:xfrm>
-            <a:prstGeom prst="frame">
-              <a:avLst>
-                <a:gd name="adj1" fmla="val 3090"/>
-              </a:avLst>
-            </a:prstGeom>
-            <a:solidFill>
-              <a:srgbClr val="FC3737"/>
-            </a:solidFill>
-            <a:ln>
-              <a:noFill/>
-            </a:ln>
-          </p:spPr>
-          <p:style>
-            <a:lnRef idx="2">
-              <a:schemeClr val="accent1">
-                <a:shade val="50000"/>
-              </a:schemeClr>
-            </a:lnRef>
-            <a:fillRef idx="1">
-              <a:schemeClr val="accent1"/>
-            </a:fillRef>
-            <a:effectRef idx="0">
-              <a:schemeClr val="accent1"/>
-            </a:effectRef>
-            <a:fontRef idx="minor">
-              <a:schemeClr val="lt1"/>
-            </a:fontRef>
-          </p:style>
-          <p:txBody>
-            <a:bodyPr rtlCol="0" anchor="ctr"/>
-            <a:lstStyle/>
-            <a:p>
-              <a:pPr algn="ctr"/>
-              <a:endParaRPr lang="en-SG">
-                <a:solidFill>
-                  <a:schemeClr val="tx1"/>
-                </a:solidFill>
-              </a:endParaRPr>
-            </a:p>
-          </p:txBody>
-        </p:sp>
-        <p:cxnSp>
-          <p:nvCxnSpPr>
-            <p:cNvPr id="11" name="Straight Arrow Connector 10">
-              <a:extLst>
-                <a:ext uri="{FF2B5EF4-FFF2-40B4-BE49-F238E27FC236}">
-                  <a16:creationId xmlns:a16="http://schemas.microsoft.com/office/drawing/2014/main" id="{2BC29DAF-C016-45CC-8616-FE291BF29665}"/>
-                </a:ext>
-              </a:extLst>
-            </p:cNvPr>
-            <p:cNvCxnSpPr>
-              <a:cxnSpLocks/>
-              <a:stCxn id="12" idx="2"/>
-            </p:cNvCxnSpPr>
-            <p:nvPr/>
-          </p:nvCxnSpPr>
-          <p:spPr>
-            <a:xfrm>
-              <a:off x="7134225" y="5105400"/>
-              <a:ext cx="0" cy="274320"/>
-            </a:xfrm>
-            <a:prstGeom prst="straightConnector1">
-              <a:avLst/>
-            </a:prstGeom>
-            <a:ln>
-              <a:solidFill>
-                <a:schemeClr val="tx2"/>
-              </a:solidFill>
-              <a:tailEnd type="triangle"/>
-            </a:ln>
-          </p:spPr>
-          <p:style>
-            <a:lnRef idx="3">
-              <a:schemeClr val="dk1"/>
-            </a:lnRef>
-            <a:fillRef idx="0">
-              <a:schemeClr val="dk1"/>
-            </a:fillRef>
-            <a:effectRef idx="2">
-              <a:schemeClr val="dk1"/>
-            </a:effectRef>
-            <a:fontRef idx="minor">
-              <a:schemeClr val="tx1"/>
-            </a:fontRef>
-          </p:style>
-        </p:cxnSp>
-        <p:sp>
-          <p:nvSpPr>
-            <p:cNvPr id="12" name="Rectangle 11">
-              <a:extLst>
-                <a:ext uri="{FF2B5EF4-FFF2-40B4-BE49-F238E27FC236}">
-                  <a16:creationId xmlns:a16="http://schemas.microsoft.com/office/drawing/2014/main" id="{C115A327-A61B-46F9-8DB9-1588E33EB3A3}"/>
-                </a:ext>
-              </a:extLst>
-            </p:cNvPr>
-            <p:cNvSpPr/>
-            <p:nvPr/>
-          </p:nvSpPr>
-          <p:spPr>
-            <a:xfrm>
-              <a:off x="5894070" y="4663440"/>
-              <a:ext cx="2480310" cy="441960"/>
-            </a:xfrm>
-            <a:prstGeom prst="rect">
-              <a:avLst/>
-            </a:prstGeom>
-            <a:solidFill>
-              <a:schemeClr val="tx2"/>
-            </a:solidFill>
-            <a:ln>
-              <a:noFill/>
-            </a:ln>
-          </p:spPr>
-          <p:style>
-            <a:lnRef idx="2">
-              <a:schemeClr val="accent1">
-                <a:shade val="50000"/>
-              </a:schemeClr>
-            </a:lnRef>
-            <a:fillRef idx="1">
-              <a:schemeClr val="accent1"/>
-            </a:fillRef>
-            <a:effectRef idx="0">
-              <a:schemeClr val="accent1"/>
-            </a:effectRef>
-            <a:fontRef idx="minor">
-              <a:schemeClr val="lt1"/>
-            </a:fontRef>
-          </p:style>
-          <p:txBody>
-            <a:bodyPr rtlCol="0" anchor="ctr"/>
-            <a:lstStyle/>
-            <a:p>
-              <a:pPr algn="ctr"/>
-              <a:r>
-                <a:rPr lang="en-US" sz="1200" dirty="0"/>
-                <a:t>The transaction adds back to the list</a:t>
-              </a:r>
-              <a:endParaRPr lang="en-SG" sz="1200" dirty="0"/>
-            </a:p>
-          </p:txBody>
-        </p:sp>
+              <a:ln>
+                <a:noFill/>
+              </a:ln>
+            </p:spPr>
+            <p:style>
+              <a:lnRef idx="2">
+                <a:schemeClr val="accent1">
+                  <a:shade val="50000"/>
+                </a:schemeClr>
+              </a:lnRef>
+              <a:fillRef idx="1">
+                <a:schemeClr val="accent1"/>
+              </a:fillRef>
+              <a:effectRef idx="0">
+                <a:schemeClr val="accent1"/>
+              </a:effectRef>
+              <a:fontRef idx="minor">
+                <a:schemeClr val="lt1"/>
+              </a:fontRef>
+            </p:style>
+            <p:txBody>
+              <a:bodyPr rtlCol="0" anchor="ctr"/>
+              <a:lstStyle/>
+              <a:p>
+                <a:pPr algn="ctr"/>
+                <a:r>
+                  <a:rPr lang="en-US" sz="1200" dirty="0"/>
+                  <a:t>The transaction adds back to the list</a:t>
+                </a:r>
+                <a:endParaRPr lang="en-SG" sz="1200" dirty="0"/>
+              </a:p>
+            </p:txBody>
+          </p:sp>
+        </p:grpSp>
       </p:grpSp>
     </p:spTree>
     <p:extLst>

</xml_diff>